<commit_message>
docs: Update Javadoc Screenshot & Page Link
</commit_message>
<xml_diff>
--- a/docs/final_presentation/FinalPresentation.pptx
+++ b/docs/final_presentation/FinalPresentation.pptx
@@ -5,15 +5,16 @@
     <p:sldMasterId id="2147483660" r:id="rId1"/>
   </p:sldMasterIdLst>
   <p:notesMasterIdLst>
-    <p:notesMasterId r:id="rId5"/>
+    <p:notesMasterId r:id="rId6"/>
   </p:notesMasterIdLst>
   <p:handoutMasterIdLst>
-    <p:handoutMasterId r:id="rId6"/>
+    <p:handoutMasterId r:id="rId7"/>
   </p:handoutMasterIdLst>
   <p:sldIdLst>
     <p:sldId id="258" r:id="rId2"/>
     <p:sldId id="259" r:id="rId3"/>
     <p:sldId id="260" r:id="rId4"/>
+    <p:sldId id="261" r:id="rId5"/>
   </p:sldIdLst>
   <p:sldSz cx="12192000" cy="6858000"/>
   <p:notesSz cx="6858000" cy="9144000"/>
@@ -1034,7 +1035,7 @@
           <a:p>
             <a:fld id="{F35A1469-2D5F-4CF6-9A65-876A4BCDDACA}" type="datetime8">
               <a:rPr lang="en-US" noProof="0" smtClean="0"/>
-              <a:t>12/1/2025 11:25 AM</a:t>
+              <a:t>12/1/2025 12:38 PM</a:t>
             </a:fld>
             <a:endParaRPr lang="en-US" noProof="0" dirty="0"/>
           </a:p>
@@ -1215,7 +1216,7 @@
           <a:p>
             <a:fld id="{B6FEBBCD-CBA1-4D0B-806D-FC14D8656200}" type="datetime8">
               <a:rPr lang="en-US" noProof="0" smtClean="0"/>
-              <a:t>12/1/2025 11:25 AM</a:t>
+              <a:t>12/1/2025 12:38 PM</a:t>
             </a:fld>
             <a:endParaRPr lang="en-US" noProof="0" dirty="0"/>
           </a:p>
@@ -1865,7 +1866,7 @@
           <a:p>
             <a:fld id="{A272C437-5C9D-4B1A-9C56-1C544AB8146E}" type="datetime8">
               <a:rPr lang="en-US" noProof="0" smtClean="0"/>
-              <a:t>12/1/2025 11:25 AM</a:t>
+              <a:t>12/1/2025 12:38 PM</a:t>
             </a:fld>
             <a:endParaRPr lang="en-US" noProof="0" dirty="0"/>
           </a:p>
@@ -1993,7 +1994,7 @@
           <a:p>
             <a:fld id="{A272C437-5C9D-4B1A-9C56-1C544AB8146E}" type="datetime8">
               <a:rPr lang="en-US" noProof="0" smtClean="0"/>
-              <a:t>12/1/2025 11:25 AM</a:t>
+              <a:t>12/1/2025 12:38 PM</a:t>
             </a:fld>
             <a:endParaRPr lang="en-US" noProof="0" dirty="0"/>
           </a:p>
@@ -2245,7 +2246,7 @@
           <a:p>
             <a:fld id="{A272C437-5C9D-4B1A-9C56-1C544AB8146E}" type="datetime8">
               <a:rPr lang="en-US" noProof="0" smtClean="0"/>
-              <a:t>12/1/2025 11:25 AM</a:t>
+              <a:t>12/1/2025 12:38 PM</a:t>
             </a:fld>
             <a:endParaRPr lang="en-US" noProof="0" dirty="0"/>
           </a:p>
@@ -2346,7 +2347,7 @@
           <a:p>
             <a:fld id="{CECF2D3B-BB2C-4EA8-8616-6D874F8BB777}" type="datetime8">
               <a:rPr lang="en-US" noProof="0" smtClean="0"/>
-              <a:t>12/1/2025 11:25 AM</a:t>
+              <a:t>12/1/2025 12:38 PM</a:t>
             </a:fld>
             <a:endParaRPr lang="en-US" noProof="0" dirty="0"/>
           </a:p>
@@ -2650,7 +2651,7 @@
           <a:p>
             <a:fld id="{D685E975-0B6B-4B58-A4AA-C8F33B87478E}" type="datetime8">
               <a:rPr lang="en-US" noProof="0" smtClean="0"/>
-              <a:t>12/1/2025 11:25 AM</a:t>
+              <a:t>12/1/2025 12:38 PM</a:t>
             </a:fld>
             <a:endParaRPr lang="en-US" noProof="0" dirty="0"/>
           </a:p>
@@ -2855,7 +2856,7 @@
           <a:p>
             <a:fld id="{D685E975-0B6B-4B58-A4AA-C8F33B87478E}" type="datetime8">
               <a:rPr lang="en-US" noProof="0" smtClean="0"/>
-              <a:t>12/1/2025 11:25 AM</a:t>
+              <a:t>12/1/2025 12:38 PM</a:t>
             </a:fld>
             <a:endParaRPr lang="en-US" noProof="0" dirty="0"/>
           </a:p>
@@ -3358,7 +3359,7 @@
           <a:p>
             <a:fld id="{0CEE1DAB-B868-4EEB-BD54-B9BAB6F58361}" type="datetime8">
               <a:rPr lang="en-US" noProof="0" smtClean="0"/>
-              <a:t>12/1/2025 11:25 AM</a:t>
+              <a:t>12/1/2025 12:38 PM</a:t>
             </a:fld>
             <a:endParaRPr lang="en-US" noProof="0" dirty="0"/>
           </a:p>
@@ -3604,7 +3605,7 @@
           <a:p>
             <a:fld id="{525A88A9-102E-4111-86E0-D51E9CB704AA}" type="datetime8">
               <a:rPr lang="en-US" noProof="0" smtClean="0"/>
-              <a:t>12/1/2025 11:25 AM</a:t>
+              <a:t>12/1/2025 12:38 PM</a:t>
             </a:fld>
             <a:endParaRPr lang="en-US" noProof="0" dirty="0"/>
           </a:p>
@@ -3783,7 +3784,7 @@
           <a:p>
             <a:fld id="{A346BD67-B37A-4DEF-9054-A91A6B18355E}" type="datetime8">
               <a:rPr lang="en-US" noProof="0" smtClean="0"/>
-              <a:t>12/1/2025 11:25 AM</a:t>
+              <a:t>12/1/2025 12:38 PM</a:t>
             </a:fld>
             <a:endParaRPr lang="en-US" noProof="0" dirty="0"/>
           </a:p>
@@ -4088,7 +4089,7 @@
           <a:p>
             <a:fld id="{F39235B7-901B-460F-BE63-E630BF7AD92D}" type="datetime8">
               <a:rPr lang="en-US" noProof="0" smtClean="0"/>
-              <a:t>12/1/2025 11:25 AM</a:t>
+              <a:t>12/1/2025 12:38 PM</a:t>
             </a:fld>
             <a:endParaRPr lang="en-US" noProof="0" dirty="0"/>
           </a:p>
@@ -4270,7 +4271,7 @@
           <a:p>
             <a:fld id="{B3601C1E-44EC-4ED6-87AC-7B26C9BC7568}" type="datetime8">
               <a:rPr lang="en-US" noProof="0" smtClean="0"/>
-              <a:t>12/1/2025 11:25 AM</a:t>
+              <a:t>12/1/2025 12:38 PM</a:t>
             </a:fld>
             <a:endParaRPr lang="en-US" noProof="0" dirty="0"/>
           </a:p>
@@ -4800,7 +4801,7 @@
           <a:p>
             <a:fld id="{4AE13B8D-7A39-483F-9092-AB66B2338492}" type="datetime8">
               <a:rPr lang="en-US" noProof="0" smtClean="0"/>
-              <a:t>12/1/2025 11:25 AM</a:t>
+              <a:t>12/1/2025 12:38 PM</a:t>
             </a:fld>
             <a:endParaRPr lang="en-US" noProof="0" dirty="0"/>
           </a:p>
@@ -5316,7 +5317,7 @@
           <a:p>
             <a:fld id="{7A1B421F-7852-47A7-8672-3F4B3DC607FF}" type="datetime8">
               <a:rPr lang="en-US" noProof="0" smtClean="0"/>
-              <a:t>12/1/2025 11:25 AM</a:t>
+              <a:t>12/1/2025 12:38 PM</a:t>
             </a:fld>
             <a:endParaRPr lang="en-US" noProof="0" dirty="0"/>
           </a:p>
@@ -5503,7 +5504,7 @@
           <a:p>
             <a:fld id="{6A1CE990-BAB9-4562-95E3-50660C2796F3}" type="datetime8">
               <a:rPr lang="en-US" noProof="0" smtClean="0"/>
-              <a:t>12/1/2025 11:25 AM</a:t>
+              <a:t>12/1/2025 12:38 PM</a:t>
             </a:fld>
             <a:endParaRPr lang="en-US" noProof="0" dirty="0"/>
           </a:p>
@@ -6205,7 +6206,7 @@
           <a:p>
             <a:fld id="{9E139DA8-D636-4336-B416-25DD0050B639}" type="datetime8">
               <a:rPr lang="en-US" noProof="0" smtClean="0"/>
-              <a:t>12/1/2025 11:25 AM</a:t>
+              <a:t>12/1/2025 12:38 PM</a:t>
             </a:fld>
             <a:endParaRPr lang="en-US" noProof="0" dirty="0"/>
           </a:p>
@@ -7324,6 +7325,150 @@
     <p:extLst>
       <p:ext uri="{BB962C8B-B14F-4D97-AF65-F5344CB8AC3E}">
         <p14:creationId xmlns:p14="http://schemas.microsoft.com/office/powerpoint/2010/main" val="4132053529"/>
+      </p:ext>
+    </p:extLst>
+  </p:cSld>
+  <p:clrMapOvr>
+    <a:masterClrMapping/>
+  </p:clrMapOvr>
+</p:sld>
+</file>
+
+<file path=ppt/slides/slide4.xml><?xml version="1.0" encoding="utf-8"?>
+<p:sld xmlns:a="http://schemas.openxmlformats.org/drawingml/2006/main" xmlns:r="http://schemas.openxmlformats.org/officeDocument/2006/relationships" xmlns:p="http://schemas.openxmlformats.org/presentationml/2006/main">
+  <p:cSld>
+    <p:spTree>
+      <p:nvGrpSpPr>
+        <p:cNvPr id="1" name=""/>
+        <p:cNvGrpSpPr/>
+        <p:nvPr/>
+      </p:nvGrpSpPr>
+      <p:grpSpPr>
+        <a:xfrm>
+          <a:off x="0" y="0"/>
+          <a:ext cx="0" cy="0"/>
+          <a:chOff x="0" y="0"/>
+          <a:chExt cx="0" cy="0"/>
+        </a:xfrm>
+      </p:grpSpPr>
+      <p:sp>
+        <p:nvSpPr>
+          <p:cNvPr id="5" name="Title 4">
+            <a:extLst>
+              <a:ext uri="{FF2B5EF4-FFF2-40B4-BE49-F238E27FC236}">
+                <a16:creationId xmlns:a16="http://schemas.microsoft.com/office/drawing/2014/main" id="{B2F502D6-AAED-BA05-EE99-8CCD0CEDBE4A}"/>
+              </a:ext>
+            </a:extLst>
+          </p:cNvPr>
+          <p:cNvSpPr>
+            <a:spLocks noGrp="1"/>
+          </p:cNvSpPr>
+          <p:nvPr>
+            <p:ph type="title"/>
+          </p:nvPr>
+        </p:nvSpPr>
+        <p:spPr>
+          <a:xfrm>
+            <a:off x="762000" y="352848"/>
+            <a:ext cx="10667998" cy="1002422"/>
+          </a:xfrm>
+        </p:spPr>
+        <p:txBody>
+          <a:bodyPr anchor="ctr">
+            <a:normAutofit/>
+          </a:bodyPr>
+          <a:lstStyle/>
+          <a:p>
+            <a:r>
+              <a:rPr lang="en-CA" dirty="0"/>
+              <a:t>Javadoc</a:t>
+            </a:r>
+          </a:p>
+        </p:txBody>
+      </p:sp>
+      <p:sp>
+        <p:nvSpPr>
+          <p:cNvPr id="3" name="Slide Number Placeholder 2">
+            <a:extLst>
+              <a:ext uri="{FF2B5EF4-FFF2-40B4-BE49-F238E27FC236}">
+                <a16:creationId xmlns:a16="http://schemas.microsoft.com/office/drawing/2014/main" id="{73B8D361-02A9-1739-EAE6-B0D305D6AE6E}"/>
+              </a:ext>
+            </a:extLst>
+          </p:cNvPr>
+          <p:cNvSpPr>
+            <a:spLocks noGrp="1"/>
+          </p:cNvSpPr>
+          <p:nvPr>
+            <p:ph type="sldNum" sz="quarter" idx="12"/>
+          </p:nvPr>
+        </p:nvSpPr>
+        <p:spPr>
+          <a:xfrm>
+            <a:off x="11784011" y="587179"/>
+            <a:ext cx="407988" cy="365125"/>
+          </a:xfrm>
+        </p:spPr>
+        <p:txBody>
+          <a:bodyPr anchor="ctr">
+            <a:normAutofit/>
+          </a:bodyPr>
+          <a:lstStyle/>
+          <a:p>
+            <a:pPr>
+              <a:spcAft>
+                <a:spcPts val="600"/>
+              </a:spcAft>
+            </a:pPr>
+            <a:fld id="{7AAC19ED-7CFA-4AF2-BE7E-6017F4B12C94}" type="slidenum">
+              <a:rPr lang="en-US" noProof="0" smtClean="0"/>
+              <a:pPr>
+                <a:spcAft>
+                  <a:spcPts val="600"/>
+                </a:spcAft>
+              </a:pPr>
+              <a:t>4</a:t>
+            </a:fld>
+            <a:endParaRPr lang="en-US" noProof="0"/>
+          </a:p>
+        </p:txBody>
+      </p:sp>
+      <p:pic>
+        <p:nvPicPr>
+          <p:cNvPr id="7" name="Picture 6">
+            <a:hlinkClick r:id="rId2" action="ppaction://hlinkfile"/>
+            <a:extLst>
+              <a:ext uri="{FF2B5EF4-FFF2-40B4-BE49-F238E27FC236}">
+                <a16:creationId xmlns:a16="http://schemas.microsoft.com/office/drawing/2014/main" id="{147D5C78-F017-413C-8A1D-B39260E9A796}"/>
+              </a:ext>
+            </a:extLst>
+          </p:cNvPr>
+          <p:cNvPicPr>
+            <a:picLocks noChangeAspect="1"/>
+          </p:cNvPicPr>
+          <p:nvPr/>
+        </p:nvPicPr>
+        <p:blipFill>
+          <a:blip r:embed="rId3"/>
+          <a:srcRect r="3396" b="-2"/>
+          <a:stretch>
+            <a:fillRect/>
+          </a:stretch>
+        </p:blipFill>
+        <p:spPr>
+          <a:xfrm>
+            <a:off x="762000" y="1534886"/>
+            <a:ext cx="7829550" cy="4275365"/>
+          </a:xfrm>
+          <a:prstGeom prst="rect">
+            <a:avLst/>
+          </a:prstGeom>
+          <a:noFill/>
+        </p:spPr>
+      </p:pic>
+    </p:spTree>
+    <p:extLst>
+      <p:ext uri="{BB962C8B-B14F-4D97-AF65-F5344CB8AC3E}">
+        <p14:creationId xmlns:p14="http://schemas.microsoft.com/office/powerpoint/2010/main" val="3221117885"/>
       </p:ext>
     </p:extLst>
   </p:cSld>

</xml_diff>

<commit_message>
docs: Launch Javadoc Page on GitHub Page & Link to Presentation
</commit_message>
<xml_diff>
--- a/docs/final_presentation/FinalPresentation.pptx
+++ b/docs/final_presentation/FinalPresentation.pptx
@@ -1035,7 +1035,7 @@
           <a:p>
             <a:fld id="{F35A1469-2D5F-4CF6-9A65-876A4BCDDACA}" type="datetime8">
               <a:rPr lang="en-US" noProof="0" smtClean="0"/>
-              <a:t>12/1/2025 12:38 PM</a:t>
+              <a:t>12/1/2025 1:44 PM</a:t>
             </a:fld>
             <a:endParaRPr lang="en-US" noProof="0" dirty="0"/>
           </a:p>
@@ -1216,7 +1216,7 @@
           <a:p>
             <a:fld id="{B6FEBBCD-CBA1-4D0B-806D-FC14D8656200}" type="datetime8">
               <a:rPr lang="en-US" noProof="0" smtClean="0"/>
-              <a:t>12/1/2025 12:38 PM</a:t>
+              <a:t>12/1/2025 1:44 PM</a:t>
             </a:fld>
             <a:endParaRPr lang="en-US" noProof="0" dirty="0"/>
           </a:p>
@@ -1866,7 +1866,7 @@
           <a:p>
             <a:fld id="{A272C437-5C9D-4B1A-9C56-1C544AB8146E}" type="datetime8">
               <a:rPr lang="en-US" noProof="0" smtClean="0"/>
-              <a:t>12/1/2025 12:38 PM</a:t>
+              <a:t>12/1/2025 1:44 PM</a:t>
             </a:fld>
             <a:endParaRPr lang="en-US" noProof="0" dirty="0"/>
           </a:p>
@@ -1994,7 +1994,7 @@
           <a:p>
             <a:fld id="{A272C437-5C9D-4B1A-9C56-1C544AB8146E}" type="datetime8">
               <a:rPr lang="en-US" noProof="0" smtClean="0"/>
-              <a:t>12/1/2025 12:38 PM</a:t>
+              <a:t>12/1/2025 1:44 PM</a:t>
             </a:fld>
             <a:endParaRPr lang="en-US" noProof="0" dirty="0"/>
           </a:p>
@@ -2246,7 +2246,7 @@
           <a:p>
             <a:fld id="{A272C437-5C9D-4B1A-9C56-1C544AB8146E}" type="datetime8">
               <a:rPr lang="en-US" noProof="0" smtClean="0"/>
-              <a:t>12/1/2025 12:38 PM</a:t>
+              <a:t>12/1/2025 1:44 PM</a:t>
             </a:fld>
             <a:endParaRPr lang="en-US" noProof="0" dirty="0"/>
           </a:p>
@@ -2347,7 +2347,7 @@
           <a:p>
             <a:fld id="{CECF2D3B-BB2C-4EA8-8616-6D874F8BB777}" type="datetime8">
               <a:rPr lang="en-US" noProof="0" smtClean="0"/>
-              <a:t>12/1/2025 12:38 PM</a:t>
+              <a:t>12/1/2025 1:44 PM</a:t>
             </a:fld>
             <a:endParaRPr lang="en-US" noProof="0" dirty="0"/>
           </a:p>
@@ -2651,7 +2651,7 @@
           <a:p>
             <a:fld id="{D685E975-0B6B-4B58-A4AA-C8F33B87478E}" type="datetime8">
               <a:rPr lang="en-US" noProof="0" smtClean="0"/>
-              <a:t>12/1/2025 12:38 PM</a:t>
+              <a:t>12/1/2025 1:44 PM</a:t>
             </a:fld>
             <a:endParaRPr lang="en-US" noProof="0" dirty="0"/>
           </a:p>
@@ -2856,7 +2856,7 @@
           <a:p>
             <a:fld id="{D685E975-0B6B-4B58-A4AA-C8F33B87478E}" type="datetime8">
               <a:rPr lang="en-US" noProof="0" smtClean="0"/>
-              <a:t>12/1/2025 12:38 PM</a:t>
+              <a:t>12/1/2025 1:44 PM</a:t>
             </a:fld>
             <a:endParaRPr lang="en-US" noProof="0" dirty="0"/>
           </a:p>
@@ -3359,7 +3359,7 @@
           <a:p>
             <a:fld id="{0CEE1DAB-B868-4EEB-BD54-B9BAB6F58361}" type="datetime8">
               <a:rPr lang="en-US" noProof="0" smtClean="0"/>
-              <a:t>12/1/2025 12:38 PM</a:t>
+              <a:t>12/1/2025 1:44 PM</a:t>
             </a:fld>
             <a:endParaRPr lang="en-US" noProof="0" dirty="0"/>
           </a:p>
@@ -3605,7 +3605,7 @@
           <a:p>
             <a:fld id="{525A88A9-102E-4111-86E0-D51E9CB704AA}" type="datetime8">
               <a:rPr lang="en-US" noProof="0" smtClean="0"/>
-              <a:t>12/1/2025 12:38 PM</a:t>
+              <a:t>12/1/2025 1:44 PM</a:t>
             </a:fld>
             <a:endParaRPr lang="en-US" noProof="0" dirty="0"/>
           </a:p>
@@ -3784,7 +3784,7 @@
           <a:p>
             <a:fld id="{A346BD67-B37A-4DEF-9054-A91A6B18355E}" type="datetime8">
               <a:rPr lang="en-US" noProof="0" smtClean="0"/>
-              <a:t>12/1/2025 12:38 PM</a:t>
+              <a:t>12/1/2025 1:44 PM</a:t>
             </a:fld>
             <a:endParaRPr lang="en-US" noProof="0" dirty="0"/>
           </a:p>
@@ -4089,7 +4089,7 @@
           <a:p>
             <a:fld id="{F39235B7-901B-460F-BE63-E630BF7AD92D}" type="datetime8">
               <a:rPr lang="en-US" noProof="0" smtClean="0"/>
-              <a:t>12/1/2025 12:38 PM</a:t>
+              <a:t>12/1/2025 1:44 PM</a:t>
             </a:fld>
             <a:endParaRPr lang="en-US" noProof="0" dirty="0"/>
           </a:p>
@@ -4271,7 +4271,7 @@
           <a:p>
             <a:fld id="{B3601C1E-44EC-4ED6-87AC-7B26C9BC7568}" type="datetime8">
               <a:rPr lang="en-US" noProof="0" smtClean="0"/>
-              <a:t>12/1/2025 12:38 PM</a:t>
+              <a:t>12/1/2025 1:44 PM</a:t>
             </a:fld>
             <a:endParaRPr lang="en-US" noProof="0" dirty="0"/>
           </a:p>
@@ -4801,7 +4801,7 @@
           <a:p>
             <a:fld id="{4AE13B8D-7A39-483F-9092-AB66B2338492}" type="datetime8">
               <a:rPr lang="en-US" noProof="0" smtClean="0"/>
-              <a:t>12/1/2025 12:38 PM</a:t>
+              <a:t>12/1/2025 1:44 PM</a:t>
             </a:fld>
             <a:endParaRPr lang="en-US" noProof="0" dirty="0"/>
           </a:p>
@@ -5317,7 +5317,7 @@
           <a:p>
             <a:fld id="{7A1B421F-7852-47A7-8672-3F4B3DC607FF}" type="datetime8">
               <a:rPr lang="en-US" noProof="0" smtClean="0"/>
-              <a:t>12/1/2025 12:38 PM</a:t>
+              <a:t>12/1/2025 1:44 PM</a:t>
             </a:fld>
             <a:endParaRPr lang="en-US" noProof="0" dirty="0"/>
           </a:p>
@@ -5504,7 +5504,7 @@
           <a:p>
             <a:fld id="{6A1CE990-BAB9-4562-95E3-50660C2796F3}" type="datetime8">
               <a:rPr lang="en-US" noProof="0" smtClean="0"/>
-              <a:t>12/1/2025 12:38 PM</a:t>
+              <a:t>12/1/2025 1:44 PM</a:t>
             </a:fld>
             <a:endParaRPr lang="en-US" noProof="0" dirty="0"/>
           </a:p>
@@ -6206,7 +6206,7 @@
           <a:p>
             <a:fld id="{9E139DA8-D636-4336-B416-25DD0050B639}" type="datetime8">
               <a:rPr lang="en-US" noProof="0" smtClean="0"/>
-              <a:t>12/1/2025 12:38 PM</a:t>
+              <a:t>12/1/2025 1:44 PM</a:t>
             </a:fld>
             <a:endParaRPr lang="en-US" noProof="0" dirty="0"/>
           </a:p>
@@ -7435,7 +7435,7 @@
       <p:pic>
         <p:nvPicPr>
           <p:cNvPr id="7" name="Picture 6">
-            <a:hlinkClick r:id="rId2" action="ppaction://hlinkfile"/>
+            <a:hlinkClick r:id="rId2"/>
             <a:extLst>
               <a:ext uri="{FF2B5EF4-FFF2-40B4-BE49-F238E27FC236}">
                 <a16:creationId xmlns:a16="http://schemas.microsoft.com/office/drawing/2014/main" id="{147D5C78-F017-413C-8A1D-B39260E9A796}"/>

</xml_diff>